<commit_message>
update title of talking relationships slide
</commit_message>
<xml_diff>
--- a/HTC-schema-sql.pptx
+++ b/HTC-schema-sql.pptx
@@ -10407,15 +10407,7 @@
                   <a:srgbClr val="333333"/>
                 </a:solidFill>
               </a:rPr>
-              <a:t> of a big </a:t>
-            </a:r>
-            <a:r>
-              <a:rPr lang="en-US" sz="3200" dirty="0" smtClean="0">
-                <a:solidFill>
-                  <a:srgbClr val="333333"/>
-                </a:solidFill>
-              </a:rPr>
-              <a:t>deal</a:t>
+              <a:t> of a big deal</a:t>
             </a:r>
           </a:p>
           <a:p>
@@ -10493,11 +10485,6 @@
               </a:rPr>
               <a:t>Many to Many</a:t>
             </a:r>
-            <a:endParaRPr lang="en-US" sz="3200" dirty="0" smtClean="0">
-              <a:solidFill>
-                <a:srgbClr val="333333"/>
-              </a:solidFill>
-            </a:endParaRPr>
           </a:p>
         </p:txBody>
       </p:sp>
@@ -11321,7 +11308,15 @@
                   <a:schemeClr val="accent1"/>
                 </a:solidFill>
               </a:rPr>
-              <a:t>DB Relationships</a:t>
+              <a:t>DB </a:t>
+            </a:r>
+            <a:r>
+              <a:rPr lang="en-US" sz="4200" dirty="0" smtClean="0">
+                <a:solidFill>
+                  <a:schemeClr val="accent1"/>
+                </a:solidFill>
+              </a:rPr>
+              <a:t>Relationships: Talk it out.</a:t>
             </a:r>
             <a:endParaRPr sz="4200" b="1" dirty="0">
               <a:solidFill>

</xml_diff>

<commit_message>
add SQL joins slide
</commit_message>
<xml_diff>
--- a/HTC-schema-sql.pptx
+++ b/HTC-schema-sql.pptx
@@ -5,7 +5,7 @@
     <p:sldMasterId id="2147483648" r:id="rId1"/>
   </p:sldMasterIdLst>
   <p:notesMasterIdLst>
-    <p:notesMasterId r:id="rId43"/>
+    <p:notesMasterId r:id="rId44"/>
   </p:notesMasterIdLst>
   <p:sldIdLst>
     <p:sldId id="256" r:id="rId2"/>
@@ -44,11 +44,12 @@
     <p:sldId id="289" r:id="rId35"/>
     <p:sldId id="290" r:id="rId36"/>
     <p:sldId id="291" r:id="rId37"/>
-    <p:sldId id="294" r:id="rId38"/>
-    <p:sldId id="295" r:id="rId39"/>
-    <p:sldId id="296" r:id="rId40"/>
-    <p:sldId id="297" r:id="rId41"/>
-    <p:sldId id="299" r:id="rId42"/>
+    <p:sldId id="302" r:id="rId38"/>
+    <p:sldId id="294" r:id="rId39"/>
+    <p:sldId id="295" r:id="rId40"/>
+    <p:sldId id="296" r:id="rId41"/>
+    <p:sldId id="297" r:id="rId42"/>
+    <p:sldId id="299" r:id="rId43"/>
   </p:sldIdLst>
   <p:sldSz cx="9144000" cy="6858000" type="screen4x3"/>
   <p:notesSz cx="6858000" cy="9144000"/>
@@ -19727,6 +19728,261 @@
       </p:grpSpPr>
       <p:sp>
         <p:nvSpPr>
+          <p:cNvPr id="182" name="Shape 182"/>
+          <p:cNvSpPr/>
+          <p:nvPr/>
+        </p:nvSpPr>
+        <p:spPr>
+          <a:xfrm>
+            <a:off x="512063" y="6331140"/>
+            <a:ext cx="8229601" cy="358141"/>
+          </a:xfrm>
+          <a:prstGeom prst="rect">
+            <a:avLst/>
+          </a:prstGeom>
+          <a:ln w="12700">
+            <a:miter lim="400000"/>
+          </a:ln>
+          <a:extLst>
+            <a:ext uri="{C572A759-6A51-4108-AA02-DFA0A04FC94B}">
+              <ma14:wrappingTextBoxFlag xmlns:ma14="http://schemas.microsoft.com/office/mac/drawingml/2011/main" val="1"/>
+            </a:ext>
+          </a:extLst>
+        </p:spPr>
+        <p:txBody>
+          <a:bodyPr lIns="0" tIns="0" rIns="0" bIns="0" anchor="ctr">
+            <a:spAutoFit/>
+          </a:bodyPr>
+          <a:lstStyle>
+            <a:lvl1pPr>
+              <a:defRPr>
+                <a:solidFill>
+                  <a:srgbClr val="7E7F80"/>
+                </a:solidFill>
+              </a:defRPr>
+            </a:lvl1pPr>
+          </a:lstStyle>
+          <a:p>
+            <a:pPr lvl="0">
+              <a:defRPr>
+                <a:solidFill>
+                  <a:srgbClr val="000000"/>
+                </a:solidFill>
+              </a:defRPr>
+            </a:pPr>
+            <a:r>
+              <a:rPr>
+                <a:solidFill>
+                  <a:srgbClr val="7E7F80"/>
+                </a:solidFill>
+              </a:rPr>
+              <a:t>Database Schema Design: Organizing Data</a:t>
+            </a:r>
+          </a:p>
+        </p:txBody>
+      </p:sp>
+      <p:sp>
+        <p:nvSpPr>
+          <p:cNvPr id="183" name="Shape 183"/>
+          <p:cNvSpPr>
+            <a:spLocks noGrp="1"/>
+          </p:cNvSpPr>
+          <p:nvPr>
+            <p:ph type="title"/>
+          </p:nvPr>
+        </p:nvSpPr>
+        <p:spPr>
+          <a:xfrm>
+            <a:off x="457200" y="105307"/>
+            <a:ext cx="8229600" cy="1143001"/>
+          </a:xfrm>
+          <a:prstGeom prst="rect">
+            <a:avLst/>
+          </a:prstGeom>
+        </p:spPr>
+        <p:txBody>
+          <a:bodyPr/>
+          <a:lstStyle/>
+          <a:p>
+            <a:pPr lvl="0">
+              <a:defRPr sz="1800" b="0">
+                <a:solidFill>
+                  <a:srgbClr val="000000"/>
+                </a:solidFill>
+              </a:defRPr>
+            </a:pPr>
+            <a:r>
+              <a:rPr lang="en-US" sz="4400" b="1" dirty="0" smtClean="0">
+                <a:solidFill>
+                  <a:srgbClr val="F8F8F8"/>
+                </a:solidFill>
+              </a:rPr>
+              <a:t>SQL Joins</a:t>
+            </a:r>
+            <a:endParaRPr sz="4400" b="1" dirty="0">
+              <a:solidFill>
+                <a:srgbClr val="F8F8F8"/>
+              </a:solidFill>
+            </a:endParaRPr>
+          </a:p>
+        </p:txBody>
+      </p:sp>
+      <p:pic>
+        <p:nvPicPr>
+          <p:cNvPr id="3" name="Picture 2" descr="sql_joins.jpg"/>
+          <p:cNvPicPr>
+            <a:picLocks noChangeAspect="1"/>
+          </p:cNvPicPr>
+          <p:nvPr/>
+        </p:nvPicPr>
+        <p:blipFill>
+          <a:blip r:embed="rId2">
+            <a:extLst>
+              <a:ext uri="{28A0092B-C50C-407E-A947-70E740481C1C}">
+                <a14:useLocalDpi xmlns:a14="http://schemas.microsoft.com/office/drawing/2010/main" val="0"/>
+              </a:ext>
+            </a:extLst>
+          </a:blip>
+          <a:stretch>
+            <a:fillRect/>
+          </a:stretch>
+        </p:blipFill>
+        <p:spPr>
+          <a:xfrm>
+            <a:off x="0" y="0"/>
+            <a:ext cx="9144000" cy="6115942"/>
+          </a:xfrm>
+          <a:prstGeom prst="rect">
+            <a:avLst/>
+          </a:prstGeom>
+        </p:spPr>
+      </p:pic>
+      <p:sp>
+        <p:nvSpPr>
+          <p:cNvPr id="4" name="TextBox 3"/>
+          <p:cNvSpPr txBox="1"/>
+          <p:nvPr/>
+        </p:nvSpPr>
+        <p:spPr>
+          <a:xfrm>
+            <a:off x="2899021" y="828330"/>
+            <a:ext cx="3339915" cy="461663"/>
+          </a:xfrm>
+          <a:prstGeom prst="rect">
+            <a:avLst/>
+          </a:prstGeom>
+          <a:noFill/>
+          <a:ln w="12700" cap="flat">
+            <a:noFill/>
+            <a:miter lim="400000"/>
+          </a:ln>
+          <a:effectLst/>
+        </p:spPr>
+        <p:style>
+          <a:lnRef idx="0">
+            <a:scrgbClr r="0" g="0" b="0"/>
+          </a:lnRef>
+          <a:fillRef idx="0">
+            <a:scrgbClr r="0" g="0" b="0"/>
+          </a:fillRef>
+          <a:effectRef idx="0">
+            <a:scrgbClr r="0" g="0" b="0"/>
+          </a:effectRef>
+          <a:fontRef idx="none"/>
+        </p:style>
+        <p:txBody>
+          <a:bodyPr rot="0" spcFirstLastPara="1" vertOverflow="overflow" horzOverflow="overflow" vert="horz" wrap="none" lIns="45719" tIns="45719" rIns="45719" bIns="45719" numCol="1" spcCol="38100" rtlCol="0" anchor="t">
+            <a:spAutoFit/>
+          </a:bodyPr>
+          <a:lstStyle/>
+          <a:p>
+            <a:pPr marL="0" marR="0" indent="0" algn="l" defTabSz="457200" rtl="0" fontAlgn="auto" latinLnBrk="1" hangingPunct="0">
+              <a:lnSpc>
+                <a:spcPct val="100000"/>
+              </a:lnSpc>
+              <a:spcBef>
+                <a:spcPts val="0"/>
+              </a:spcBef>
+              <a:spcAft>
+                <a:spcPts val="0"/>
+              </a:spcAft>
+              <a:buClrTx/>
+              <a:buSzTx/>
+              <a:buFontTx/>
+              <a:buNone/>
+              <a:tabLst/>
+            </a:pPr>
+            <a:r>
+              <a:rPr lang="en-US" sz="2400" dirty="0" smtClean="0">
+                <a:solidFill>
+                  <a:srgbClr val="000000"/>
+                </a:solidFill>
+              </a:rPr>
+              <a:t>More Detail @ </a:t>
+            </a:r>
+            <a:r>
+              <a:rPr lang="en-US" sz="2400" dirty="0" smtClean="0">
+                <a:solidFill>
+                  <a:srgbClr val="000000"/>
+                </a:solidFill>
+                <a:hlinkClick r:id="rId3"/>
+              </a:rPr>
+              <a:t>the Source</a:t>
+            </a:r>
+            <a:endParaRPr kumimoji="0" lang="en-US" sz="2400" b="0" i="0" u="none" strike="noStrike" cap="none" spc="0" normalizeH="0" baseline="0" dirty="0">
+              <a:ln>
+                <a:noFill/>
+              </a:ln>
+              <a:solidFill>
+                <a:srgbClr val="000000"/>
+              </a:solidFill>
+              <a:effectLst/>
+              <a:uFillTx/>
+              <a:sym typeface="Calibri"/>
+            </a:endParaRPr>
+          </a:p>
+        </p:txBody>
+      </p:sp>
+    </p:spTree>
+    <p:extLst>
+      <p:ext uri="{BB962C8B-B14F-4D97-AF65-F5344CB8AC3E}">
+        <p14:creationId xmlns:p14="http://schemas.microsoft.com/office/powerpoint/2010/main" val="322398702"/>
+      </p:ext>
+    </p:extLst>
+  </p:cSld>
+  <p:clrMapOvr>
+    <a:masterClrMapping/>
+  </p:clrMapOvr>
+  <p:transition xmlns:p14="http://schemas.microsoft.com/office/powerpoint/2010/main" spd="med"/>
+  <p:timing>
+    <p:tnLst>
+      <p:par>
+        <p:cTn xmlns:p14="http://schemas.microsoft.com/office/powerpoint/2010/main" id="1" dur="indefinite" restart="never" nodeType="tmRoot"/>
+      </p:par>
+    </p:tnLst>
+  </p:timing>
+</p:sld>
+</file>
+
+<file path=ppt/slides/slide38.xml><?xml version="1.0" encoding="utf-8"?>
+<p:sld xmlns:a="http://schemas.openxmlformats.org/drawingml/2006/main" xmlns:r="http://schemas.openxmlformats.org/officeDocument/2006/relationships" xmlns:p="http://schemas.openxmlformats.org/presentationml/2006/main">
+  <p:cSld>
+    <p:spTree>
+      <p:nvGrpSpPr>
+        <p:cNvPr id="1" name=""/>
+        <p:cNvGrpSpPr/>
+        <p:nvPr/>
+      </p:nvGrpSpPr>
+      <p:grpSpPr>
+        <a:xfrm>
+          <a:off x="0" y="0"/>
+          <a:ext cx="0" cy="0"/>
+          <a:chOff x="0" y="0"/>
+          <a:chExt cx="0" cy="0"/>
+        </a:xfrm>
+      </p:grpSpPr>
+      <p:sp>
+        <p:nvSpPr>
           <p:cNvPr id="124" name="Shape 124"/>
           <p:cNvSpPr/>
           <p:nvPr/>
@@ -20256,7 +20512,7 @@
 </p:sld>
 </file>
 
-<file path=ppt/slides/slide38.xml><?xml version="1.0" encoding="utf-8"?>
+<file path=ppt/slides/slide39.xml><?xml version="1.0" encoding="utf-8"?>
 <p:sld xmlns:a="http://schemas.openxmlformats.org/drawingml/2006/main" xmlns:r="http://schemas.openxmlformats.org/officeDocument/2006/relationships" xmlns:p="http://schemas.openxmlformats.org/presentationml/2006/main">
   <p:cSld>
     <p:spTree>
@@ -20683,175 +20939,6 @@
     <p:extLst>
       <p:ext uri="{BB962C8B-B14F-4D97-AF65-F5344CB8AC3E}">
         <p14:creationId xmlns:p14="http://schemas.microsoft.com/office/powerpoint/2010/main" val="1008332473"/>
-      </p:ext>
-    </p:extLst>
-  </p:cSld>
-  <p:clrMapOvr>
-    <a:masterClrMapping/>
-  </p:clrMapOvr>
-  <p:transition xmlns:p14="http://schemas.microsoft.com/office/powerpoint/2010/main" spd="med"/>
-  <p:timing>
-    <p:tnLst>
-      <p:par>
-        <p:cTn xmlns:p14="http://schemas.microsoft.com/office/powerpoint/2010/main" id="1" dur="indefinite" restart="never" nodeType="tmRoot"/>
-      </p:par>
-    </p:tnLst>
-  </p:timing>
-</p:sld>
-</file>
-
-<file path=ppt/slides/slide39.xml><?xml version="1.0" encoding="utf-8"?>
-<p:sld xmlns:a="http://schemas.openxmlformats.org/drawingml/2006/main" xmlns:r="http://schemas.openxmlformats.org/officeDocument/2006/relationships" xmlns:p="http://schemas.openxmlformats.org/presentationml/2006/main">
-  <p:cSld>
-    <p:spTree>
-      <p:nvGrpSpPr>
-        <p:cNvPr id="1" name=""/>
-        <p:cNvGrpSpPr/>
-        <p:nvPr/>
-      </p:nvGrpSpPr>
-      <p:grpSpPr>
-        <a:xfrm>
-          <a:off x="0" y="0"/>
-          <a:ext cx="0" cy="0"/>
-          <a:chOff x="0" y="0"/>
-          <a:chExt cx="0" cy="0"/>
-        </a:xfrm>
-      </p:grpSpPr>
-      <p:sp>
-        <p:nvSpPr>
-          <p:cNvPr id="124" name="Shape 124"/>
-          <p:cNvSpPr/>
-          <p:nvPr/>
-        </p:nvSpPr>
-        <p:spPr>
-          <a:xfrm>
-            <a:off x="512063" y="6331140"/>
-            <a:ext cx="8229601" cy="358141"/>
-          </a:xfrm>
-          <a:prstGeom prst="rect">
-            <a:avLst/>
-          </a:prstGeom>
-          <a:ln w="12700">
-            <a:miter lim="400000"/>
-          </a:ln>
-          <a:extLst>
-            <a:ext uri="{C572A759-6A51-4108-AA02-DFA0A04FC94B}">
-              <ma14:wrappingTextBoxFlag xmlns:ma14="http://schemas.microsoft.com/office/mac/drawingml/2011/main" val="1"/>
-            </a:ext>
-          </a:extLst>
-        </p:spPr>
-        <p:txBody>
-          <a:bodyPr lIns="0" tIns="0" rIns="0" bIns="0" anchor="ctr">
-            <a:spAutoFit/>
-          </a:bodyPr>
-          <a:lstStyle>
-            <a:lvl1pPr>
-              <a:defRPr>
-                <a:solidFill>
-                  <a:srgbClr val="7E7F80"/>
-                </a:solidFill>
-              </a:defRPr>
-            </a:lvl1pPr>
-          </a:lstStyle>
-          <a:p>
-            <a:pPr lvl="0">
-              <a:defRPr>
-                <a:solidFill>
-                  <a:srgbClr val="000000"/>
-                </a:solidFill>
-              </a:defRPr>
-            </a:pPr>
-            <a:r>
-              <a:rPr>
-                <a:solidFill>
-                  <a:srgbClr val="7E7F80"/>
-                </a:solidFill>
-              </a:rPr>
-              <a:t>Database Schema Design: Organizing Data</a:t>
-            </a:r>
-          </a:p>
-        </p:txBody>
-      </p:sp>
-      <p:sp>
-        <p:nvSpPr>
-          <p:cNvPr id="125" name="Shape 125"/>
-          <p:cNvSpPr>
-            <a:spLocks noGrp="1"/>
-          </p:cNvSpPr>
-          <p:nvPr>
-            <p:ph type="title"/>
-          </p:nvPr>
-        </p:nvSpPr>
-        <p:spPr>
-          <a:xfrm>
-            <a:off x="457200" y="105307"/>
-            <a:ext cx="8229600" cy="1143001"/>
-          </a:xfrm>
-          <a:prstGeom prst="rect">
-            <a:avLst/>
-          </a:prstGeom>
-        </p:spPr>
-        <p:txBody>
-          <a:bodyPr/>
-          <a:lstStyle/>
-          <a:p>
-            <a:pPr lvl="0">
-              <a:defRPr sz="1800" b="0">
-                <a:solidFill>
-                  <a:srgbClr val="000000"/>
-                </a:solidFill>
-              </a:defRPr>
-            </a:pPr>
-            <a:r>
-              <a:rPr lang="en-US" sz="4400" b="1" dirty="0" smtClean="0">
-                <a:solidFill>
-                  <a:srgbClr val="F8F8F8"/>
-                </a:solidFill>
-              </a:rPr>
-              <a:t>SQL Statements</a:t>
-            </a:r>
-            <a:endParaRPr sz="4400" b="1" dirty="0">
-              <a:solidFill>
-                <a:srgbClr val="F8F8F8"/>
-              </a:solidFill>
-            </a:endParaRPr>
-          </a:p>
-        </p:txBody>
-      </p:sp>
-      <p:pic>
-        <p:nvPicPr>
-          <p:cNvPr id="3" name="Picture 2" descr="insert-oranges.tiff"/>
-          <p:cNvPicPr>
-            <a:picLocks noChangeAspect="1"/>
-          </p:cNvPicPr>
-          <p:nvPr/>
-        </p:nvPicPr>
-        <p:blipFill>
-          <a:blip r:embed="rId2">
-            <a:extLst>
-              <a:ext uri="{28A0092B-C50C-407E-A947-70E740481C1C}">
-                <a14:useLocalDpi xmlns:a14="http://schemas.microsoft.com/office/drawing/2010/main" val="0"/>
-              </a:ext>
-            </a:extLst>
-          </a:blip>
-          <a:stretch>
-            <a:fillRect/>
-          </a:stretch>
-        </p:blipFill>
-        <p:spPr>
-          <a:xfrm>
-            <a:off x="2628900" y="2219169"/>
-            <a:ext cx="3886200" cy="2971800"/>
-          </a:xfrm>
-          <a:prstGeom prst="rect">
-            <a:avLst/>
-          </a:prstGeom>
-        </p:spPr>
-      </p:pic>
-    </p:spTree>
-    <p:extLst>
-      <p:ext uri="{BB962C8B-B14F-4D97-AF65-F5344CB8AC3E}">
-        <p14:creationId xmlns:p14="http://schemas.microsoft.com/office/powerpoint/2010/main" val="838347337"/>
       </p:ext>
     </p:extLst>
   </p:cSld>
@@ -21354,6 +21441,175 @@
       </p:sp>
       <p:pic>
         <p:nvPicPr>
+          <p:cNvPr id="3" name="Picture 2" descr="insert-oranges.tiff"/>
+          <p:cNvPicPr>
+            <a:picLocks noChangeAspect="1"/>
+          </p:cNvPicPr>
+          <p:nvPr/>
+        </p:nvPicPr>
+        <p:blipFill>
+          <a:blip r:embed="rId2">
+            <a:extLst>
+              <a:ext uri="{28A0092B-C50C-407E-A947-70E740481C1C}">
+                <a14:useLocalDpi xmlns:a14="http://schemas.microsoft.com/office/drawing/2010/main" val="0"/>
+              </a:ext>
+            </a:extLst>
+          </a:blip>
+          <a:stretch>
+            <a:fillRect/>
+          </a:stretch>
+        </p:blipFill>
+        <p:spPr>
+          <a:xfrm>
+            <a:off x="2628900" y="2219169"/>
+            <a:ext cx="3886200" cy="2971800"/>
+          </a:xfrm>
+          <a:prstGeom prst="rect">
+            <a:avLst/>
+          </a:prstGeom>
+        </p:spPr>
+      </p:pic>
+    </p:spTree>
+    <p:extLst>
+      <p:ext uri="{BB962C8B-B14F-4D97-AF65-F5344CB8AC3E}">
+        <p14:creationId xmlns:p14="http://schemas.microsoft.com/office/powerpoint/2010/main" val="838347337"/>
+      </p:ext>
+    </p:extLst>
+  </p:cSld>
+  <p:clrMapOvr>
+    <a:masterClrMapping/>
+  </p:clrMapOvr>
+  <p:transition xmlns:p14="http://schemas.microsoft.com/office/powerpoint/2010/main" spd="med"/>
+  <p:timing>
+    <p:tnLst>
+      <p:par>
+        <p:cTn xmlns:p14="http://schemas.microsoft.com/office/powerpoint/2010/main" id="1" dur="indefinite" restart="never" nodeType="tmRoot"/>
+      </p:par>
+    </p:tnLst>
+  </p:timing>
+</p:sld>
+</file>
+
+<file path=ppt/slides/slide41.xml><?xml version="1.0" encoding="utf-8"?>
+<p:sld xmlns:a="http://schemas.openxmlformats.org/drawingml/2006/main" xmlns:r="http://schemas.openxmlformats.org/officeDocument/2006/relationships" xmlns:p="http://schemas.openxmlformats.org/presentationml/2006/main">
+  <p:cSld>
+    <p:spTree>
+      <p:nvGrpSpPr>
+        <p:cNvPr id="1" name=""/>
+        <p:cNvGrpSpPr/>
+        <p:nvPr/>
+      </p:nvGrpSpPr>
+      <p:grpSpPr>
+        <a:xfrm>
+          <a:off x="0" y="0"/>
+          <a:ext cx="0" cy="0"/>
+          <a:chOff x="0" y="0"/>
+          <a:chExt cx="0" cy="0"/>
+        </a:xfrm>
+      </p:grpSpPr>
+      <p:sp>
+        <p:nvSpPr>
+          <p:cNvPr id="124" name="Shape 124"/>
+          <p:cNvSpPr/>
+          <p:nvPr/>
+        </p:nvSpPr>
+        <p:spPr>
+          <a:xfrm>
+            <a:off x="512063" y="6331140"/>
+            <a:ext cx="8229601" cy="358141"/>
+          </a:xfrm>
+          <a:prstGeom prst="rect">
+            <a:avLst/>
+          </a:prstGeom>
+          <a:ln w="12700">
+            <a:miter lim="400000"/>
+          </a:ln>
+          <a:extLst>
+            <a:ext uri="{C572A759-6A51-4108-AA02-DFA0A04FC94B}">
+              <ma14:wrappingTextBoxFlag xmlns:ma14="http://schemas.microsoft.com/office/mac/drawingml/2011/main" val="1"/>
+            </a:ext>
+          </a:extLst>
+        </p:spPr>
+        <p:txBody>
+          <a:bodyPr lIns="0" tIns="0" rIns="0" bIns="0" anchor="ctr">
+            <a:spAutoFit/>
+          </a:bodyPr>
+          <a:lstStyle>
+            <a:lvl1pPr>
+              <a:defRPr>
+                <a:solidFill>
+                  <a:srgbClr val="7E7F80"/>
+                </a:solidFill>
+              </a:defRPr>
+            </a:lvl1pPr>
+          </a:lstStyle>
+          <a:p>
+            <a:pPr lvl="0">
+              <a:defRPr>
+                <a:solidFill>
+                  <a:srgbClr val="000000"/>
+                </a:solidFill>
+              </a:defRPr>
+            </a:pPr>
+            <a:r>
+              <a:rPr>
+                <a:solidFill>
+                  <a:srgbClr val="7E7F80"/>
+                </a:solidFill>
+              </a:rPr>
+              <a:t>Database Schema Design: Organizing Data</a:t>
+            </a:r>
+          </a:p>
+        </p:txBody>
+      </p:sp>
+      <p:sp>
+        <p:nvSpPr>
+          <p:cNvPr id="125" name="Shape 125"/>
+          <p:cNvSpPr>
+            <a:spLocks noGrp="1"/>
+          </p:cNvSpPr>
+          <p:nvPr>
+            <p:ph type="title"/>
+          </p:nvPr>
+        </p:nvSpPr>
+        <p:spPr>
+          <a:xfrm>
+            <a:off x="457200" y="105307"/>
+            <a:ext cx="8229600" cy="1143001"/>
+          </a:xfrm>
+          <a:prstGeom prst="rect">
+            <a:avLst/>
+          </a:prstGeom>
+        </p:spPr>
+        <p:txBody>
+          <a:bodyPr/>
+          <a:lstStyle/>
+          <a:p>
+            <a:pPr lvl="0">
+              <a:defRPr sz="1800" b="0">
+                <a:solidFill>
+                  <a:srgbClr val="000000"/>
+                </a:solidFill>
+              </a:defRPr>
+            </a:pPr>
+            <a:r>
+              <a:rPr lang="en-US" sz="4400" b="1" dirty="0" smtClean="0">
+                <a:solidFill>
+                  <a:srgbClr val="F8F8F8"/>
+                </a:solidFill>
+              </a:rPr>
+              <a:t>SQL Statements</a:t>
+            </a:r>
+            <a:endParaRPr sz="4400" b="1" dirty="0">
+              <a:solidFill>
+                <a:srgbClr val="F8F8F8"/>
+              </a:solidFill>
+            </a:endParaRPr>
+          </a:p>
+        </p:txBody>
+      </p:sp>
+      <p:pic>
+        <p:nvPicPr>
           <p:cNvPr id="2" name="Picture 1" descr="select-oranges.tiff"/>
           <p:cNvPicPr>
             <a:picLocks noChangeAspect="1"/>
@@ -21403,7 +21659,7 @@
 </p:sld>
 </file>
 
-<file path=ppt/slides/slide41.xml><?xml version="1.0" encoding="utf-8"?>
+<file path=ppt/slides/slide42.xml><?xml version="1.0" encoding="utf-8"?>
 <p:sld xmlns:a="http://schemas.openxmlformats.org/drawingml/2006/main" xmlns:r="http://schemas.openxmlformats.org/officeDocument/2006/relationships" xmlns:p="http://schemas.openxmlformats.org/presentationml/2006/main">
   <p:cSld>
     <p:spTree>

</xml_diff>

<commit_message>
add cheatsheet & links
</commit_message>
<xml_diff>
--- a/HTC-schema-sql.pptx
+++ b/HTC-schema-sql.pptx
@@ -5,7 +5,7 @@
     <p:sldMasterId id="2147483648" r:id="rId1"/>
   </p:sldMasterIdLst>
   <p:notesMasterIdLst>
-    <p:notesMasterId r:id="rId44"/>
+    <p:notesMasterId r:id="rId46"/>
   </p:notesMasterIdLst>
   <p:sldIdLst>
     <p:sldId id="256" r:id="rId2"/>
@@ -49,7 +49,9 @@
     <p:sldId id="295" r:id="rId40"/>
     <p:sldId id="296" r:id="rId41"/>
     <p:sldId id="297" r:id="rId42"/>
-    <p:sldId id="299" r:id="rId43"/>
+    <p:sldId id="303" r:id="rId43"/>
+    <p:sldId id="304" r:id="rId44"/>
+    <p:sldId id="299" r:id="rId45"/>
   </p:sldIdLst>
   <p:sldSz cx="9144000" cy="6858000" type="screen4x3"/>
   <p:notesSz cx="6858000" cy="9144000"/>
@@ -19850,7 +19852,7 @@
         <p:spPr>
           <a:xfrm>
             <a:off x="0" y="0"/>
-            <a:ext cx="9144000" cy="6115942"/>
+            <a:ext cx="9144000" cy="6858000"/>
           </a:xfrm>
           <a:prstGeom prst="rect">
             <a:avLst/>
@@ -21660,6 +21662,506 @@
 </file>
 
 <file path=ppt/slides/slide42.xml><?xml version="1.0" encoding="utf-8"?>
+<p:sld xmlns:a="http://schemas.openxmlformats.org/drawingml/2006/main" xmlns:r="http://schemas.openxmlformats.org/officeDocument/2006/relationships" xmlns:p="http://schemas.openxmlformats.org/presentationml/2006/main">
+  <p:cSld>
+    <p:spTree>
+      <p:nvGrpSpPr>
+        <p:cNvPr id="1" name=""/>
+        <p:cNvGrpSpPr/>
+        <p:nvPr/>
+      </p:nvGrpSpPr>
+      <p:grpSpPr>
+        <a:xfrm>
+          <a:off x="0" y="0"/>
+          <a:ext cx="0" cy="0"/>
+          <a:chOff x="0" y="0"/>
+          <a:chExt cx="0" cy="0"/>
+        </a:xfrm>
+      </p:grpSpPr>
+      <p:sp>
+        <p:nvSpPr>
+          <p:cNvPr id="124" name="Shape 124"/>
+          <p:cNvSpPr/>
+          <p:nvPr/>
+        </p:nvSpPr>
+        <p:spPr>
+          <a:xfrm>
+            <a:off x="512063" y="6331140"/>
+            <a:ext cx="8229601" cy="358141"/>
+          </a:xfrm>
+          <a:prstGeom prst="rect">
+            <a:avLst/>
+          </a:prstGeom>
+          <a:ln w="12700">
+            <a:miter lim="400000"/>
+          </a:ln>
+          <a:extLst>
+            <a:ext uri="{C572A759-6A51-4108-AA02-DFA0A04FC94B}">
+              <ma14:wrappingTextBoxFlag xmlns:ma14="http://schemas.microsoft.com/office/mac/drawingml/2011/main" val="1"/>
+            </a:ext>
+          </a:extLst>
+        </p:spPr>
+        <p:txBody>
+          <a:bodyPr lIns="0" tIns="0" rIns="0" bIns="0" anchor="ctr">
+            <a:spAutoFit/>
+          </a:bodyPr>
+          <a:lstStyle>
+            <a:lvl1pPr>
+              <a:defRPr>
+                <a:solidFill>
+                  <a:srgbClr val="7E7F80"/>
+                </a:solidFill>
+              </a:defRPr>
+            </a:lvl1pPr>
+          </a:lstStyle>
+          <a:p>
+            <a:pPr lvl="0">
+              <a:defRPr>
+                <a:solidFill>
+                  <a:srgbClr val="000000"/>
+                </a:solidFill>
+              </a:defRPr>
+            </a:pPr>
+            <a:r>
+              <a:rPr>
+                <a:solidFill>
+                  <a:srgbClr val="7E7F80"/>
+                </a:solidFill>
+              </a:rPr>
+              <a:t>Database Schema Design: Organizing Data</a:t>
+            </a:r>
+          </a:p>
+        </p:txBody>
+      </p:sp>
+      <p:sp>
+        <p:nvSpPr>
+          <p:cNvPr id="125" name="Shape 125"/>
+          <p:cNvSpPr>
+            <a:spLocks noGrp="1"/>
+          </p:cNvSpPr>
+          <p:nvPr>
+            <p:ph type="title"/>
+          </p:nvPr>
+        </p:nvSpPr>
+        <p:spPr>
+          <a:xfrm>
+            <a:off x="457200" y="105307"/>
+            <a:ext cx="8229600" cy="1143001"/>
+          </a:xfrm>
+          <a:prstGeom prst="rect">
+            <a:avLst/>
+          </a:prstGeom>
+        </p:spPr>
+        <p:txBody>
+          <a:bodyPr/>
+          <a:lstStyle/>
+          <a:p>
+            <a:pPr lvl="0">
+              <a:defRPr sz="1800" b="0">
+                <a:solidFill>
+                  <a:srgbClr val="000000"/>
+                </a:solidFill>
+              </a:defRPr>
+            </a:pPr>
+            <a:r>
+              <a:rPr lang="en-US" sz="4400" b="1" dirty="0" smtClean="0">
+                <a:solidFill>
+                  <a:srgbClr val="F8F8F8"/>
+                </a:solidFill>
+              </a:rPr>
+              <a:t>SQL Links:</a:t>
+            </a:r>
+            <a:endParaRPr sz="4400" b="1" dirty="0">
+              <a:solidFill>
+                <a:srgbClr val="F8F8F8"/>
+              </a:solidFill>
+            </a:endParaRPr>
+          </a:p>
+        </p:txBody>
+      </p:sp>
+      <p:sp>
+        <p:nvSpPr>
+          <p:cNvPr id="3" name="TextBox 2"/>
+          <p:cNvSpPr txBox="1"/>
+          <p:nvPr/>
+        </p:nvSpPr>
+        <p:spPr>
+          <a:xfrm>
+            <a:off x="1339072" y="2968345"/>
+            <a:ext cx="6509765" cy="1477325"/>
+          </a:xfrm>
+          <a:prstGeom prst="rect">
+            <a:avLst/>
+          </a:prstGeom>
+          <a:noFill/>
+          <a:ln w="12700" cap="flat">
+            <a:noFill/>
+            <a:miter lim="400000"/>
+          </a:ln>
+          <a:effectLst/>
+        </p:spPr>
+        <p:style>
+          <a:lnRef idx="0">
+            <a:scrgbClr r="0" g="0" b="0"/>
+          </a:lnRef>
+          <a:fillRef idx="0">
+            <a:scrgbClr r="0" g="0" b="0"/>
+          </a:fillRef>
+          <a:effectRef idx="0">
+            <a:scrgbClr r="0" g="0" b="0"/>
+          </a:effectRef>
+          <a:fontRef idx="none"/>
+        </p:style>
+        <p:txBody>
+          <a:bodyPr rot="0" spcFirstLastPara="1" vertOverflow="overflow" horzOverflow="overflow" vert="horz" wrap="none" lIns="45719" tIns="45719" rIns="45719" bIns="45719" numCol="1" spcCol="38100" rtlCol="0" anchor="t">
+            <a:spAutoFit/>
+          </a:bodyPr>
+          <a:lstStyle/>
+          <a:p>
+            <a:pPr algn="ctr" rtl="0" latinLnBrk="1" hangingPunct="0"/>
+            <a:r>
+              <a:rPr kumimoji="0" lang="en-US" sz="1800" b="0" i="0" u="none" strike="noStrike" cap="none" spc="0" normalizeH="0" baseline="0" dirty="0" smtClean="0">
+                <a:ln>
+                  <a:noFill/>
+                </a:ln>
+                <a:solidFill>
+                  <a:srgbClr val="000000"/>
+                </a:solidFill>
+                <a:effectLst/>
+                <a:uFillTx/>
+                <a:sym typeface="Calibri"/>
+                <a:hlinkClick r:id="rId2"/>
+              </a:rPr>
+              <a:t>http://www.cheat-sheets.org/sites/sql.su/  </a:t>
+            </a:r>
+            <a:endParaRPr kumimoji="0" lang="en-US" sz="1800" b="0" i="0" u="none" strike="noStrike" cap="none" spc="0" normalizeH="0" baseline="0" dirty="0" smtClean="0">
+              <a:ln>
+                <a:noFill/>
+              </a:ln>
+              <a:solidFill>
+                <a:srgbClr val="000000"/>
+              </a:solidFill>
+              <a:effectLst/>
+              <a:uFillTx/>
+              <a:sym typeface="Calibri"/>
+            </a:endParaRPr>
+          </a:p>
+          <a:p>
+            <a:pPr algn="ctr" rtl="0" latinLnBrk="1" hangingPunct="0"/>
+            <a:endParaRPr lang="en-US" dirty="0">
+              <a:solidFill>
+                <a:srgbClr val="000000"/>
+              </a:solidFill>
+              <a:latin typeface="Calibri"/>
+              <a:ea typeface="Calibri"/>
+              <a:cs typeface="Calibri"/>
+            </a:endParaRPr>
+          </a:p>
+          <a:p>
+            <a:pPr algn="ctr" rtl="0" latinLnBrk="1" hangingPunct="0"/>
+            <a:r>
+              <a:rPr lang="en-US" dirty="0">
+                <a:solidFill>
+                  <a:srgbClr val="000000"/>
+                </a:solidFill>
+                <a:hlinkClick r:id="rId3"/>
+              </a:rPr>
+              <a:t>https://dev.mysql.com/doc/refman/5.0/en/group-by-</a:t>
+            </a:r>
+            <a:r>
+              <a:rPr lang="en-US" dirty="0" smtClean="0">
+                <a:solidFill>
+                  <a:srgbClr val="000000"/>
+                </a:solidFill>
+                <a:hlinkClick r:id="rId3"/>
+              </a:rPr>
+              <a:t>functions.html</a:t>
+            </a:r>
+            <a:endParaRPr lang="en-US" dirty="0" smtClean="0">
+              <a:solidFill>
+                <a:srgbClr val="000000"/>
+              </a:solidFill>
+            </a:endParaRPr>
+          </a:p>
+          <a:p>
+            <a:pPr algn="ctr" rtl="0" latinLnBrk="1" hangingPunct="0"/>
+            <a:endParaRPr kumimoji="0" lang="en-US" sz="1800" b="0" i="0" u="none" strike="noStrike" cap="none" spc="0" normalizeH="0" baseline="0" dirty="0">
+              <a:ln>
+                <a:noFill/>
+              </a:ln>
+              <a:solidFill>
+                <a:srgbClr val="000000"/>
+              </a:solidFill>
+              <a:effectLst/>
+              <a:uFillTx/>
+              <a:latin typeface="Calibri"/>
+              <a:ea typeface="Calibri"/>
+              <a:cs typeface="Calibri"/>
+              <a:sym typeface="Calibri"/>
+            </a:endParaRPr>
+          </a:p>
+          <a:p>
+            <a:pPr algn="ctr" rtl="0" latinLnBrk="1" hangingPunct="0"/>
+            <a:r>
+              <a:rPr lang="en-US" dirty="0">
+                <a:solidFill>
+                  <a:srgbClr val="000000"/>
+                </a:solidFill>
+                <a:hlinkClick r:id="rId4"/>
+              </a:rPr>
+              <a:t>http://</a:t>
+            </a:r>
+            <a:r>
+              <a:rPr lang="en-US" dirty="0" err="1">
+                <a:solidFill>
+                  <a:srgbClr val="000000"/>
+                </a:solidFill>
+                <a:hlinkClick r:id="rId4"/>
+              </a:rPr>
+              <a:t>lmgtfy.com</a:t>
+            </a:r>
+            <a:r>
+              <a:rPr lang="en-US" dirty="0">
+                <a:solidFill>
+                  <a:srgbClr val="000000"/>
+                </a:solidFill>
+                <a:hlinkClick r:id="rId4"/>
+              </a:rPr>
+              <a:t>/?q=</a:t>
+            </a:r>
+            <a:r>
+              <a:rPr lang="en-US" dirty="0" err="1">
+                <a:solidFill>
+                  <a:srgbClr val="000000"/>
+                </a:solidFill>
+                <a:hlinkClick r:id="rId4"/>
+              </a:rPr>
+              <a:t>SQL+group+by+aggregate+functions</a:t>
+            </a:r>
+            <a:endParaRPr kumimoji="0" lang="en-US" sz="1800" b="0" i="0" u="none" strike="noStrike" cap="none" spc="0" normalizeH="0" baseline="0" dirty="0">
+              <a:ln>
+                <a:noFill/>
+              </a:ln>
+              <a:solidFill>
+                <a:srgbClr val="000000"/>
+              </a:solidFill>
+              <a:effectLst/>
+              <a:uFillTx/>
+              <a:latin typeface="Calibri"/>
+              <a:ea typeface="Calibri"/>
+              <a:cs typeface="Calibri"/>
+              <a:sym typeface="Calibri"/>
+            </a:endParaRPr>
+          </a:p>
+        </p:txBody>
+      </p:sp>
+    </p:spTree>
+    <p:extLst>
+      <p:ext uri="{BB962C8B-B14F-4D97-AF65-F5344CB8AC3E}">
+        <p14:creationId xmlns:p14="http://schemas.microsoft.com/office/powerpoint/2010/main" val="4006852712"/>
+      </p:ext>
+    </p:extLst>
+  </p:cSld>
+  <p:clrMapOvr>
+    <a:masterClrMapping/>
+  </p:clrMapOvr>
+  <p:transition xmlns:p14="http://schemas.microsoft.com/office/powerpoint/2010/main" spd="med"/>
+  <p:timing>
+    <p:tnLst>
+      <p:par>
+        <p:cTn xmlns:p14="http://schemas.microsoft.com/office/powerpoint/2010/main" id="1" dur="indefinite" restart="never" nodeType="tmRoot"/>
+      </p:par>
+    </p:tnLst>
+  </p:timing>
+</p:sld>
+</file>
+
+<file path=ppt/slides/slide43.xml><?xml version="1.0" encoding="utf-8"?>
+<p:sld xmlns:a="http://schemas.openxmlformats.org/drawingml/2006/main" xmlns:r="http://schemas.openxmlformats.org/officeDocument/2006/relationships" xmlns:p="http://schemas.openxmlformats.org/presentationml/2006/main">
+  <p:cSld>
+    <p:spTree>
+      <p:nvGrpSpPr>
+        <p:cNvPr id="1" name=""/>
+        <p:cNvGrpSpPr/>
+        <p:nvPr/>
+      </p:nvGrpSpPr>
+      <p:grpSpPr>
+        <a:xfrm>
+          <a:off x="0" y="0"/>
+          <a:ext cx="0" cy="0"/>
+          <a:chOff x="0" y="0"/>
+          <a:chExt cx="0" cy="0"/>
+        </a:xfrm>
+      </p:grpSpPr>
+      <p:sp>
+        <p:nvSpPr>
+          <p:cNvPr id="124" name="Shape 124"/>
+          <p:cNvSpPr/>
+          <p:nvPr/>
+        </p:nvSpPr>
+        <p:spPr>
+          <a:xfrm>
+            <a:off x="512063" y="6331140"/>
+            <a:ext cx="8229601" cy="358141"/>
+          </a:xfrm>
+          <a:prstGeom prst="rect">
+            <a:avLst/>
+          </a:prstGeom>
+          <a:ln w="12700">
+            <a:miter lim="400000"/>
+          </a:ln>
+          <a:extLst>
+            <a:ext uri="{C572A759-6A51-4108-AA02-DFA0A04FC94B}">
+              <ma14:wrappingTextBoxFlag xmlns:ma14="http://schemas.microsoft.com/office/mac/drawingml/2011/main" val="1"/>
+            </a:ext>
+          </a:extLst>
+        </p:spPr>
+        <p:txBody>
+          <a:bodyPr lIns="0" tIns="0" rIns="0" bIns="0" anchor="ctr">
+            <a:spAutoFit/>
+          </a:bodyPr>
+          <a:lstStyle>
+            <a:lvl1pPr>
+              <a:defRPr>
+                <a:solidFill>
+                  <a:srgbClr val="7E7F80"/>
+                </a:solidFill>
+              </a:defRPr>
+            </a:lvl1pPr>
+          </a:lstStyle>
+          <a:p>
+            <a:pPr lvl="0">
+              <a:defRPr>
+                <a:solidFill>
+                  <a:srgbClr val="000000"/>
+                </a:solidFill>
+              </a:defRPr>
+            </a:pPr>
+            <a:r>
+              <a:rPr>
+                <a:solidFill>
+                  <a:srgbClr val="7E7F80"/>
+                </a:solidFill>
+              </a:rPr>
+              <a:t>Database Schema Design: Organizing Data</a:t>
+            </a:r>
+          </a:p>
+        </p:txBody>
+      </p:sp>
+      <p:sp>
+        <p:nvSpPr>
+          <p:cNvPr id="125" name="Shape 125"/>
+          <p:cNvSpPr>
+            <a:spLocks noGrp="1"/>
+          </p:cNvSpPr>
+          <p:nvPr>
+            <p:ph type="title"/>
+          </p:nvPr>
+        </p:nvSpPr>
+        <p:spPr>
+          <a:xfrm>
+            <a:off x="457200" y="105307"/>
+            <a:ext cx="8229600" cy="1143001"/>
+          </a:xfrm>
+          <a:prstGeom prst="rect">
+            <a:avLst/>
+          </a:prstGeom>
+        </p:spPr>
+        <p:txBody>
+          <a:bodyPr/>
+          <a:lstStyle/>
+          <a:p>
+            <a:pPr lvl="0">
+              <a:defRPr sz="1800" b="0">
+                <a:solidFill>
+                  <a:srgbClr val="000000"/>
+                </a:solidFill>
+              </a:defRPr>
+            </a:pPr>
+            <a:r>
+              <a:rPr lang="en-US" sz="4400" b="1" dirty="0" smtClean="0">
+                <a:solidFill>
+                  <a:srgbClr val="F8F8F8"/>
+                </a:solidFill>
+              </a:rPr>
+              <a:t>SQL </a:t>
+            </a:r>
+            <a:r>
+              <a:rPr lang="en-US" sz="4400" b="1" dirty="0" err="1" smtClean="0">
+                <a:solidFill>
+                  <a:srgbClr val="F8F8F8"/>
+                </a:solidFill>
+              </a:rPr>
+              <a:t>CheatSheet</a:t>
+            </a:r>
+            <a:r>
+              <a:rPr lang="en-US" sz="4400" b="1" dirty="0" smtClean="0">
+                <a:solidFill>
+                  <a:srgbClr val="F8F8F8"/>
+                </a:solidFill>
+              </a:rPr>
+              <a:t>:</a:t>
+            </a:r>
+            <a:endParaRPr sz="4400" b="1" dirty="0">
+              <a:solidFill>
+                <a:srgbClr val="F8F8F8"/>
+              </a:solidFill>
+            </a:endParaRPr>
+          </a:p>
+        </p:txBody>
+      </p:sp>
+      <p:pic>
+        <p:nvPicPr>
+          <p:cNvPr id="2" name="Picture 1" descr="sqlcheetsheet.gif"/>
+          <p:cNvPicPr>
+            <a:picLocks noChangeAspect="1"/>
+          </p:cNvPicPr>
+          <p:nvPr/>
+        </p:nvPicPr>
+        <p:blipFill>
+          <a:blip r:embed="rId2">
+            <a:extLst>
+              <a:ext uri="{28A0092B-C50C-407E-A947-70E740481C1C}">
+                <a14:useLocalDpi xmlns:a14="http://schemas.microsoft.com/office/drawing/2010/main" val="0"/>
+              </a:ext>
+            </a:extLst>
+          </a:blip>
+          <a:stretch>
+            <a:fillRect/>
+          </a:stretch>
+        </p:blipFill>
+        <p:spPr>
+          <a:xfrm>
+            <a:off x="0" y="0"/>
+            <a:ext cx="9144000" cy="6858000"/>
+          </a:xfrm>
+          <a:prstGeom prst="rect">
+            <a:avLst/>
+          </a:prstGeom>
+        </p:spPr>
+      </p:pic>
+    </p:spTree>
+    <p:extLst>
+      <p:ext uri="{BB962C8B-B14F-4D97-AF65-F5344CB8AC3E}">
+        <p14:creationId xmlns:p14="http://schemas.microsoft.com/office/powerpoint/2010/main" val="2666544262"/>
+      </p:ext>
+    </p:extLst>
+  </p:cSld>
+  <p:clrMapOvr>
+    <a:masterClrMapping/>
+  </p:clrMapOvr>
+  <p:transition xmlns:p14="http://schemas.microsoft.com/office/powerpoint/2010/main" spd="med"/>
+  <p:timing>
+    <p:tnLst>
+      <p:par>
+        <p:cTn xmlns:p14="http://schemas.microsoft.com/office/powerpoint/2010/main" id="1" dur="indefinite" restart="never" nodeType="tmRoot"/>
+      </p:par>
+    </p:tnLst>
+  </p:timing>
+</p:sld>
+</file>
+
+<file path=ppt/slides/slide44.xml><?xml version="1.0" encoding="utf-8"?>
 <p:sld xmlns:a="http://schemas.openxmlformats.org/drawingml/2006/main" xmlns:r="http://schemas.openxmlformats.org/officeDocument/2006/relationships" xmlns:p="http://schemas.openxmlformats.org/presentationml/2006/main">
   <p:cSld>
     <p:spTree>

</xml_diff>